<commit_message>
poster shit done lets print p00000000p
</commit_message>
<xml_diff>
--- a/poster/poster_ac221_final.pptx
+++ b/poster/poster_ac221_final.pptx
@@ -7993,32 +7993,10 @@
                 <a:ea typeface="Verdana" panose="020B0604030504040204" pitchFamily="34" charset="0"/>
                 <a:cs typeface="Baghdad" pitchFamily="2" charset="-78"/>
               </a:rPr>
-              <a:t>Karina Huang, </a:t>
-            </a:r>
-            <a:r>
-              <a:rPr lang="en-US" sz="6000" dirty="0" err="1">
-                <a:solidFill>
-                  <a:schemeClr val="bg1"/>
-                </a:solidFill>
-                <a:latin typeface="Avenir Roman" panose="02000503020000020003" pitchFamily="2" charset="0"/>
-                <a:ea typeface="Verdana" panose="020B0604030504040204" pitchFamily="34" charset="0"/>
-                <a:cs typeface="Baghdad" pitchFamily="2" charset="-78"/>
-              </a:rPr>
-              <a:t>Lipika</a:t>
-            </a:r>
-            <a:r>
-              <a:rPr lang="en-US" sz="6000">
-                <a:solidFill>
-                  <a:schemeClr val="bg1"/>
-                </a:solidFill>
-                <a:latin typeface="Avenir Roman" panose="02000503020000020003" pitchFamily="2" charset="0"/>
-                <a:ea typeface="Verdana" panose="020B0604030504040204" pitchFamily="34" charset="0"/>
-                <a:cs typeface="Baghdad" pitchFamily="2" charset="-78"/>
-              </a:rPr>
-              <a:t> Ramaswamy</a:t>
+              <a:t>Karina Huang, Lipika Ramaswamy</a:t>
             </a:r>
             <a:br>
-              <a:rPr lang="en-US" sz="6000">
+              <a:rPr lang="en-US" sz="6000" dirty="0">
                 <a:solidFill>
                   <a:schemeClr val="bg1"/>
                 </a:solidFill>
@@ -8028,17 +8006,6 @@
               </a:rPr>
             </a:br>
             <a:r>
-              <a:rPr lang="en-US" sz="4000">
-                <a:solidFill>
-                  <a:schemeClr val="bg1"/>
-                </a:solidFill>
-                <a:latin typeface="Avenir Roman" panose="02000503020000020003" pitchFamily="2" charset="0"/>
-                <a:ea typeface="Verdana" panose="020B0604030504040204" pitchFamily="34" charset="0"/>
-                <a:cs typeface="Baghdad" pitchFamily="2" charset="-78"/>
-              </a:rPr>
-              <a:t>Institute </a:t>
-            </a:r>
-            <a:r>
               <a:rPr lang="en-US" sz="4000" dirty="0">
                 <a:solidFill>
                   <a:schemeClr val="bg1"/>
@@ -8047,7 +8014,7 @@
                 <a:ea typeface="Verdana" panose="020B0604030504040204" pitchFamily="34" charset="0"/>
                 <a:cs typeface="Baghdad" pitchFamily="2" charset="-78"/>
               </a:rPr>
-              <a:t>for Applied Computational Science, Harvard University</a:t>
+              <a:t>Institute for Applied Computational Science, Harvard University</a:t>
             </a:r>
           </a:p>
         </p:txBody>
@@ -8318,7 +8285,7 @@
         </p:blipFill>
         <p:spPr>
           <a:xfrm>
-            <a:off x="1151166" y="-32982"/>
+            <a:off x="1185601" y="-51005"/>
             <a:ext cx="2629458" cy="4019883"/>
           </a:xfrm>
           <a:prstGeom prst="rect">
@@ -8460,29 +8427,7 @@
                 <a:ea typeface="Verdana" panose="020B0604030504040204" pitchFamily="34" charset="0"/>
                 <a:cs typeface="Baghdad" pitchFamily="2" charset="-78"/>
               </a:rPr>
-              <a:t>The Quantitative Input Influence (QII) framework (</a:t>
-            </a:r>
-            <a:r>
-              <a:rPr lang="en-US" sz="4400" dirty="0" err="1">
-                <a:solidFill>
-                  <a:schemeClr val="tx1"/>
-                </a:solidFill>
-                <a:latin typeface="Avenir Roman" panose="02000503020000020003" pitchFamily="2" charset="0"/>
-                <a:ea typeface="Verdana" panose="020B0604030504040204" pitchFamily="34" charset="0"/>
-                <a:cs typeface="Baghdad" pitchFamily="2" charset="-78"/>
-              </a:rPr>
-              <a:t>Datta</a:t>
-            </a:r>
-            <a:r>
-              <a:rPr lang="en-US" sz="4400" dirty="0">
-                <a:solidFill>
-                  <a:schemeClr val="tx1"/>
-                </a:solidFill>
-                <a:latin typeface="Avenir Roman" panose="02000503020000020003" pitchFamily="2" charset="0"/>
-                <a:ea typeface="Verdana" panose="020B0604030504040204" pitchFamily="34" charset="0"/>
-                <a:cs typeface="Baghdad" pitchFamily="2" charset="-78"/>
-              </a:rPr>
-              <a:t> et al., 2016) offers effective and straight-forward explanations of algorithms by quantifying the influence of input features on individual and group observations.</a:t>
+              <a:t>The Quantitative Input Influence (QII) framework (Datta et al., 2016) offers effective and straight-forward explanations of algorithms by quantifying the influence of input features on individual and group observations.</a:t>
             </a:r>
           </a:p>
           <a:p>
@@ -10464,6 +10409,35 @@
           </a:prstGeom>
         </p:spPr>
       </p:pic>
+      <p:pic>
+        <p:nvPicPr>
+          <p:cNvPr id="12" name="Picture 11">
+            <a:extLst>
+              <a:ext uri="{FF2B5EF4-FFF2-40B4-BE49-F238E27FC236}">
+                <a16:creationId xmlns:a16="http://schemas.microsoft.com/office/drawing/2014/main" id="{4E79EB90-43B6-A642-B8E7-6EC50131016F}"/>
+              </a:ext>
+            </a:extLst>
+          </p:cNvPr>
+          <p:cNvPicPr>
+            <a:picLocks noChangeAspect="1"/>
+          </p:cNvPicPr>
+          <p:nvPr/>
+        </p:nvPicPr>
+        <p:blipFill rotWithShape="1">
+          <a:blip r:embed="rId9"/>
+          <a:srcRect r="84695"/>
+          <a:stretch/>
+        </p:blipFill>
+        <p:spPr>
+          <a:xfrm>
+            <a:off x="40105442" y="777422"/>
+            <a:ext cx="2629458" cy="3071802"/>
+          </a:xfrm>
+          <a:prstGeom prst="rect">
+            <a:avLst/>
+          </a:prstGeom>
+        </p:spPr>
+      </p:pic>
     </p:spTree>
   </p:cSld>
   <p:clrMapOvr>

</xml_diff>